<commit_message>
Fix [s] vs [q] in Queue implementation
</commit_message>
<xml_diff>
--- a/22-proofs3/lec.pptx
+++ b/22-proofs3/lec.pptx
@@ -8236,7 +8236,7 @@
                 </a:solidFill>
                 <a:latin typeface="Courier" pitchFamily="2" charset="0"/>
               </a:rPr>
-              <a:t> s </a:t>
+              <a:t> q </a:t>
             </a:r>
             <a:r>
               <a:rPr lang="en-US" dirty="0">
@@ -8272,7 +8272,7 @@
                 </a:solidFill>
                 <a:latin typeface="Courier" pitchFamily="2" charset="0"/>
               </a:rPr>
-              <a:t>s </a:t>
+              <a:t>q </a:t>
             </a:r>
             <a:r>
               <a:rPr lang="en-US" dirty="0">
@@ -8438,10 +8438,19 @@
                 </a:solidFill>
                 <a:latin typeface="Courier" pitchFamily="2" charset="0"/>
               </a:rPr>
-              <a:t> x s </a:t>
-            </a:r>
-            <a:r>
-              <a:rPr lang="en-US" dirty="0">
+              <a:t> </a:t>
+            </a:r>
+            <a:r>
+              <a:rPr lang="en-US">
+                <a:solidFill>
+                  <a:srgbClr val="000000"/>
+                </a:solidFill>
+                <a:latin typeface="Courier" pitchFamily="2" charset="0"/>
+              </a:rPr>
+              <a:t>x q </a:t>
+            </a:r>
+            <a:r>
+              <a:rPr lang="en-US">
                 <a:solidFill>
                   <a:srgbClr val="6D6F24"/>
                 </a:solidFill>
@@ -8450,13 +8459,13 @@
               <a:t>=</a:t>
             </a:r>
             <a:r>
-              <a:rPr lang="en-US" dirty="0">
-                <a:solidFill>
-                  <a:srgbClr val="000000"/>
-                </a:solidFill>
-                <a:latin typeface="Courier" pitchFamily="2" charset="0"/>
-              </a:rPr>
-              <a:t> s </a:t>
+              <a:rPr lang="en-US">
+                <a:solidFill>
+                  <a:srgbClr val="000000"/>
+                </a:solidFill>
+                <a:latin typeface="Courier" pitchFamily="2" charset="0"/>
+              </a:rPr>
+              <a:t> q </a:t>
             </a:r>
             <a:r>
               <a:rPr lang="en-US" dirty="0">

</xml_diff>